<commit_message>
fitting text into text frame, not done yet
</commit_message>
<xml_diff>
--- a/sample.pptx
+++ b/sample.pptx
@@ -251,7 +251,7 @@
           <a:p>
             <a:fld id="{F73F0BFC-2C88-4AAF-B42F-33B416312C7A}" type="datetimeFigureOut">
               <a:rPr lang="en-US" smtClean="0"/>
-              <a:t>1/4/2024</a:t>
+              <a:t>1/5/2024</a:t>
             </a:fld>
             <a:endParaRPr lang="en-US"/>
           </a:p>
@@ -448,7 +448,7 @@
           <a:p>
             <a:fld id="{F73F0BFC-2C88-4AAF-B42F-33B416312C7A}" type="datetimeFigureOut">
               <a:rPr lang="en-US" smtClean="0"/>
-              <a:t>1/4/2024</a:t>
+              <a:t>1/5/2024</a:t>
             </a:fld>
             <a:endParaRPr lang="en-US"/>
           </a:p>
@@ -639,7 +639,7 @@
           <a:p>
             <a:fld id="{F73F0BFC-2C88-4AAF-B42F-33B416312C7A}" type="datetimeFigureOut">
               <a:rPr lang="en-US" smtClean="0"/>
-              <a:t>1/4/2024</a:t>
+              <a:t>1/5/2024</a:t>
             </a:fld>
             <a:endParaRPr lang="en-US"/>
           </a:p>
@@ -820,7 +820,7 @@
           <a:p>
             <a:fld id="{F73F0BFC-2C88-4AAF-B42F-33B416312C7A}" type="datetimeFigureOut">
               <a:rPr lang="en-US" smtClean="0"/>
-              <a:t>1/4/2024</a:t>
+              <a:t>1/5/2024</a:t>
             </a:fld>
             <a:endParaRPr lang="en-US"/>
           </a:p>
@@ -1024,7 +1024,7 @@
           <a:p>
             <a:fld id="{F73F0BFC-2C88-4AAF-B42F-33B416312C7A}" type="datetimeFigureOut">
               <a:rPr lang="en-US" smtClean="0"/>
-              <a:t>1/4/2024</a:t>
+              <a:t>1/5/2024</a:t>
             </a:fld>
             <a:endParaRPr lang="en-US"/>
           </a:p>
@@ -1322,7 +1322,7 @@
           <a:p>
             <a:fld id="{F73F0BFC-2C88-4AAF-B42F-33B416312C7A}" type="datetimeFigureOut">
               <a:rPr lang="en-US" smtClean="0"/>
-              <a:t>1/4/2024</a:t>
+              <a:t>1/5/2024</a:t>
             </a:fld>
             <a:endParaRPr lang="en-US"/>
           </a:p>
@@ -1759,7 +1759,7 @@
           <a:p>
             <a:fld id="{F73F0BFC-2C88-4AAF-B42F-33B416312C7A}" type="datetimeFigureOut">
               <a:rPr lang="en-US" smtClean="0"/>
-              <a:t>1/4/2024</a:t>
+              <a:t>1/5/2024</a:t>
             </a:fld>
             <a:endParaRPr lang="en-US"/>
           </a:p>
@@ -1889,7 +1889,7 @@
           <a:p>
             <a:fld id="{F73F0BFC-2C88-4AAF-B42F-33B416312C7A}" type="datetimeFigureOut">
               <a:rPr lang="en-US" smtClean="0"/>
-              <a:t>1/4/2024</a:t>
+              <a:t>1/5/2024</a:t>
             </a:fld>
             <a:endParaRPr lang="en-US"/>
           </a:p>
@@ -1997,7 +1997,7 @@
           <a:p>
             <a:fld id="{F73F0BFC-2C88-4AAF-B42F-33B416312C7A}" type="datetimeFigureOut">
               <a:rPr lang="en-US" smtClean="0"/>
-              <a:t>1/4/2024</a:t>
+              <a:t>1/5/2024</a:t>
             </a:fld>
             <a:endParaRPr lang="en-US"/>
           </a:p>
@@ -2285,7 +2285,7 @@
           <a:p>
             <a:fld id="{F73F0BFC-2C88-4AAF-B42F-33B416312C7A}" type="datetimeFigureOut">
               <a:rPr lang="en-US" smtClean="0"/>
-              <a:t>1/4/2024</a:t>
+              <a:t>1/5/2024</a:t>
             </a:fld>
             <a:endParaRPr lang="en-US"/>
           </a:p>
@@ -2554,7 +2554,7 @@
           <a:p>
             <a:fld id="{F73F0BFC-2C88-4AAF-B42F-33B416312C7A}" type="datetimeFigureOut">
               <a:rPr lang="en-US" smtClean="0"/>
-              <a:t>1/4/2024</a:t>
+              <a:t>1/5/2024</a:t>
             </a:fld>
             <a:endParaRPr lang="en-US"/>
           </a:p>
@@ -2808,7 +2808,7 @@
           <a:p>
             <a:fld id="{F73F0BFC-2C88-4AAF-B42F-33B416312C7A}" type="datetimeFigureOut">
               <a:rPr lang="en-US" smtClean="0"/>
-              <a:t>1/4/2024</a:t>
+              <a:t>1/5/2024</a:t>
             </a:fld>
             <a:endParaRPr lang="en-US"/>
           </a:p>
@@ -3570,8 +3570,8 @@
         </p:nvSpPr>
         <p:spPr bwMode="auto">
           <a:xfrm>
-            <a:off x="685800" y="2057400"/>
-            <a:ext cx="7924800" cy="4267200"/>
+            <a:off x="685800" y="1828800"/>
+            <a:ext cx="7924800" cy="4648200"/>
           </a:xfrm>
           <a:prstGeom prst="rect">
             <a:avLst/>
@@ -3844,6 +3844,59 @@
               <a:rPr lang="en-US" dirty="0"/>
               <a:t>Here is an outline of bulleted points</a:t>
             </a:r>
+          </a:p>
+          <a:p>
+            <a:r>
+              <a:rPr lang="en-US" dirty="0"/>
+              <a:t>This is my second paragraph</a:t>
+            </a:r>
+          </a:p>
+          <a:p>
+            <a:r>
+              <a:rPr lang="en-US" dirty="0" err="1"/>
+              <a:t>Thuis</a:t>
+            </a:r>
+            <a:r>
+              <a:rPr lang="en-US" dirty="0"/>
+              <a:t> is my third </a:t>
+            </a:r>
+            <a:r>
+              <a:rPr lang="en-US" dirty="0" err="1"/>
+              <a:t>Parapgatbfmbkeubjk</a:t>
+            </a:r>
+            <a:r>
+              <a:rPr lang="en-US" dirty="0"/>
+              <a:t> </a:t>
+            </a:r>
+            <a:r>
+              <a:rPr lang="en-US" dirty="0" err="1"/>
+              <a:t>c,skfhnkej</a:t>
+            </a:r>
+            <a:r>
+              <a:rPr lang="en-US" dirty="0"/>
+              <a:t> </a:t>
+            </a:r>
+            <a:r>
+              <a:rPr lang="en-US" dirty="0" err="1"/>
+              <a:t>fkjebfjh</a:t>
+            </a:r>
+            <a:r>
+              <a:rPr lang="en-US" dirty="0"/>
+              <a:t> </a:t>
+            </a:r>
+            <a:r>
+              <a:rPr lang="en-US" dirty="0" err="1"/>
+              <a:t>f,jekfbegb</a:t>
+            </a:r>
+            <a:r>
+              <a:rPr lang="en-US" dirty="0"/>
+              <a:t> </a:t>
+            </a:r>
+            <a:r>
+              <a:rPr lang="en-US" dirty="0" err="1"/>
+              <a:t>erlg,erkngek</a:t>
+            </a:r>
+            <a:endParaRPr lang="en-US" dirty="0"/>
           </a:p>
           <a:p>
             <a:pPr marL="0" indent="0">

</xml_diff>